<commit_message>
FEAT: add prediction models
</commit_message>
<xml_diff>
--- a/FinalAssigment.pptx
+++ b/FinalAssigment.pptx
@@ -5,7 +5,7 @@
     <p:sldMasterId id="2147483648" r:id="rId1"/>
   </p:sldMasterIdLst>
   <p:notesMasterIdLst>
-    <p:notesMasterId r:id="rId46"/>
+    <p:notesMasterId r:id="rId47"/>
   </p:notesMasterIdLst>
   <p:sldIdLst>
     <p:sldId id="256" r:id="rId2"/>
@@ -52,6 +52,7 @@
     <p:sldId id="297" r:id="rId43"/>
     <p:sldId id="298" r:id="rId44"/>
     <p:sldId id="300" r:id="rId45"/>
+    <p:sldId id="304" r:id="rId46"/>
   </p:sldIdLst>
   <p:sldSz cx="12192000" cy="6858000"/>
   <p:notesSz cx="6858000" cy="9144000"/>
@@ -150,6 +151,11 @@
       </a:defRPr>
     </a:lvl9pPr>
   </p:defaultTextStyle>
+  <p:extLst>
+    <p:ext uri="{EFAFB233-063F-42B5-8137-9DF3F51BA10A}">
+      <p15:sldGuideLst xmlns:p15="http://schemas.microsoft.com/office/powerpoint/2012/main"/>
+    </p:ext>
+  </p:extLst>
 </p:presentation>
 </file>
 
@@ -235,7 +241,7 @@
           <a:p>
             <a:fld id="{2F8244FA-36DB-6D48-AFD6-5EF091F35812}" type="datetimeFigureOut">
               <a:rPr lang="en-US" smtClean="0"/>
-              <a:t>7/7/24</a:t>
+              <a:t>7/16/24</a:t>
             </a:fld>
             <a:endParaRPr lang="en-US"/>
           </a:p>
@@ -2014,6 +2020,90 @@
 </p:notes>
 </file>
 
+<file path=ppt/notesSlides/notesSlide26.xml><?xml version="1.0" encoding="utf-8"?>
+<p:notes xmlns:a="http://schemas.openxmlformats.org/drawingml/2006/main" xmlns:r="http://schemas.openxmlformats.org/officeDocument/2006/relationships" xmlns:p="http://schemas.openxmlformats.org/presentationml/2006/main">
+  <p:cSld>
+    <p:spTree>
+      <p:nvGrpSpPr>
+        <p:cNvPr id="1" name=""/>
+        <p:cNvGrpSpPr/>
+        <p:nvPr/>
+      </p:nvGrpSpPr>
+      <p:grpSpPr>
+        <a:xfrm>
+          <a:off x="0" y="0"/>
+          <a:ext cx="0" cy="0"/>
+          <a:chOff x="0" y="0"/>
+          <a:chExt cx="0" cy="0"/>
+        </a:xfrm>
+      </p:grpSpPr>
+      <p:sp>
+        <p:nvSpPr>
+          <p:cNvPr id="2" name="Slide Image Placeholder 1"/>
+          <p:cNvSpPr>
+            <a:spLocks noGrp="1" noRot="1" noChangeAspect="1"/>
+          </p:cNvSpPr>
+          <p:nvPr>
+            <p:ph type="sldImg"/>
+          </p:nvPr>
+        </p:nvSpPr>
+        <p:spPr/>
+      </p:sp>
+      <p:sp>
+        <p:nvSpPr>
+          <p:cNvPr id="3" name="Notes Placeholder 2"/>
+          <p:cNvSpPr>
+            <a:spLocks noGrp="1"/>
+          </p:cNvSpPr>
+          <p:nvPr>
+            <p:ph type="body" idx="1"/>
+          </p:nvPr>
+        </p:nvSpPr>
+        <p:spPr/>
+        <p:txBody>
+          <a:bodyPr/>
+          <a:lstStyle/>
+          <a:p>
+            <a:endParaRPr lang="en-US" dirty="0"/>
+          </a:p>
+        </p:txBody>
+      </p:sp>
+      <p:sp>
+        <p:nvSpPr>
+          <p:cNvPr id="4" name="Slide Number Placeholder 3"/>
+          <p:cNvSpPr>
+            <a:spLocks noGrp="1"/>
+          </p:cNvSpPr>
+          <p:nvPr>
+            <p:ph type="sldNum" sz="quarter" idx="10"/>
+          </p:nvPr>
+        </p:nvSpPr>
+        <p:spPr/>
+        <p:txBody>
+          <a:bodyPr/>
+          <a:lstStyle/>
+          <a:p>
+            <a:fld id="{9493D7C2-B47A-D347-B6DB-18C57D35C624}" type="slidenum">
+              <a:rPr lang="en-US" smtClean="0"/>
+              <a:t>45</a:t>
+            </a:fld>
+            <a:endParaRPr lang="en-US"/>
+          </a:p>
+        </p:txBody>
+      </p:sp>
+    </p:spTree>
+    <p:extLst>
+      <p:ext uri="{BB962C8B-B14F-4D97-AF65-F5344CB8AC3E}">
+        <p14:creationId xmlns:p14="http://schemas.microsoft.com/office/powerpoint/2010/main" val="346387053"/>
+      </p:ext>
+    </p:extLst>
+  </p:cSld>
+  <p:clrMapOvr>
+    <a:masterClrMapping/>
+  </p:clrMapOvr>
+</p:notes>
+</file>
+
 <file path=ppt/notesSlides/notesSlide3.xml><?xml version="1.0" encoding="utf-8"?>
 <p:notes xmlns:a="http://schemas.openxmlformats.org/drawingml/2006/main" xmlns:r="http://schemas.openxmlformats.org/officeDocument/2006/relationships" xmlns:p="http://schemas.openxmlformats.org/presentationml/2006/main">
   <p:cSld>
@@ -2749,7 +2839,7 @@
           <a:p>
             <a:fld id="{5095E7E8-3E56-FE47-BCD6-D03ECC461AFC}" type="datetimeFigureOut">
               <a:rPr lang="en-US" smtClean="0"/>
-              <a:t>7/7/24</a:t>
+              <a:t>7/16/24</a:t>
             </a:fld>
             <a:endParaRPr lang="en-US"/>
           </a:p>
@@ -2947,7 +3037,7 @@
           <a:p>
             <a:fld id="{5095E7E8-3E56-FE47-BCD6-D03ECC461AFC}" type="datetimeFigureOut">
               <a:rPr lang="en-US" smtClean="0"/>
-              <a:t>7/7/24</a:t>
+              <a:t>7/16/24</a:t>
             </a:fld>
             <a:endParaRPr lang="en-US"/>
           </a:p>
@@ -3155,7 +3245,7 @@
           <a:p>
             <a:fld id="{5095E7E8-3E56-FE47-BCD6-D03ECC461AFC}" type="datetimeFigureOut">
               <a:rPr lang="en-US" smtClean="0"/>
-              <a:t>7/7/24</a:t>
+              <a:t>7/16/24</a:t>
             </a:fld>
             <a:endParaRPr lang="en-US"/>
           </a:p>
@@ -3353,7 +3443,7 @@
           <a:p>
             <a:fld id="{5095E7E8-3E56-FE47-BCD6-D03ECC461AFC}" type="datetimeFigureOut">
               <a:rPr lang="en-US" smtClean="0"/>
-              <a:t>7/7/24</a:t>
+              <a:t>7/16/24</a:t>
             </a:fld>
             <a:endParaRPr lang="en-US"/>
           </a:p>
@@ -3628,7 +3718,7 @@
           <a:p>
             <a:fld id="{5095E7E8-3E56-FE47-BCD6-D03ECC461AFC}" type="datetimeFigureOut">
               <a:rPr lang="en-US" smtClean="0"/>
-              <a:t>7/7/24</a:t>
+              <a:t>7/16/24</a:t>
             </a:fld>
             <a:endParaRPr lang="en-US"/>
           </a:p>
@@ -3893,7 +3983,7 @@
           <a:p>
             <a:fld id="{5095E7E8-3E56-FE47-BCD6-D03ECC461AFC}" type="datetimeFigureOut">
               <a:rPr lang="en-US" smtClean="0"/>
-              <a:t>7/7/24</a:t>
+              <a:t>7/16/24</a:t>
             </a:fld>
             <a:endParaRPr lang="en-US"/>
           </a:p>
@@ -4305,7 +4395,7 @@
           <a:p>
             <a:fld id="{5095E7E8-3E56-FE47-BCD6-D03ECC461AFC}" type="datetimeFigureOut">
               <a:rPr lang="en-US" smtClean="0"/>
-              <a:t>7/7/24</a:t>
+              <a:t>7/16/24</a:t>
             </a:fld>
             <a:endParaRPr lang="en-US"/>
           </a:p>
@@ -4446,7 +4536,7 @@
           <a:p>
             <a:fld id="{5095E7E8-3E56-FE47-BCD6-D03ECC461AFC}" type="datetimeFigureOut">
               <a:rPr lang="en-US" smtClean="0"/>
-              <a:t>7/7/24</a:t>
+              <a:t>7/16/24</a:t>
             </a:fld>
             <a:endParaRPr lang="en-US"/>
           </a:p>
@@ -4559,7 +4649,7 @@
           <a:p>
             <a:fld id="{5095E7E8-3E56-FE47-BCD6-D03ECC461AFC}" type="datetimeFigureOut">
               <a:rPr lang="en-US" smtClean="0"/>
-              <a:t>7/7/24</a:t>
+              <a:t>7/16/24</a:t>
             </a:fld>
             <a:endParaRPr lang="en-US"/>
           </a:p>
@@ -4870,7 +4960,7 @@
           <a:p>
             <a:fld id="{5095E7E8-3E56-FE47-BCD6-D03ECC461AFC}" type="datetimeFigureOut">
               <a:rPr lang="en-US" smtClean="0"/>
-              <a:t>7/7/24</a:t>
+              <a:t>7/16/24</a:t>
             </a:fld>
             <a:endParaRPr lang="en-US"/>
           </a:p>
@@ -5158,7 +5248,7 @@
           <a:p>
             <a:fld id="{5095E7E8-3E56-FE47-BCD6-D03ECC461AFC}" type="datetimeFigureOut">
               <a:rPr lang="en-US" smtClean="0"/>
-              <a:t>7/7/24</a:t>
+              <a:t>7/16/24</a:t>
             </a:fld>
             <a:endParaRPr lang="en-US"/>
           </a:p>
@@ -5399,7 +5489,7 @@
           <a:p>
             <a:fld id="{5095E7E8-3E56-FE47-BCD6-D03ECC461AFC}" type="datetimeFigureOut">
               <a:rPr lang="en-US" smtClean="0"/>
-              <a:t>7/7/24</a:t>
+              <a:t>7/16/24</a:t>
             </a:fld>
             <a:endParaRPr lang="en-US"/>
           </a:p>
@@ -16237,6 +16327,169 @@
     <p:extLst>
       <p:ext uri="{BB962C8B-B14F-4D97-AF65-F5344CB8AC3E}">
         <p14:creationId xmlns:p14="http://schemas.microsoft.com/office/powerpoint/2010/main" val="3949170425"/>
+      </p:ext>
+    </p:extLst>
+  </p:cSld>
+  <p:clrMapOvr>
+    <a:masterClrMapping/>
+  </p:clrMapOvr>
+</p:sld>
+</file>
+
+<file path=ppt/slides/slide45.xml><?xml version="1.0" encoding="utf-8"?>
+<p:sld xmlns:a="http://schemas.openxmlformats.org/drawingml/2006/main" xmlns:r="http://schemas.openxmlformats.org/officeDocument/2006/relationships" xmlns:p="http://schemas.openxmlformats.org/presentationml/2006/main">
+  <p:cSld>
+    <p:bg>
+      <p:bgPr>
+        <a:solidFill>
+          <a:srgbClr val="1F1F1F"/>
+        </a:solidFill>
+        <a:effectLst/>
+      </p:bgPr>
+    </p:bg>
+    <p:spTree>
+      <p:nvGrpSpPr>
+        <p:cNvPr id="1" name=""/>
+        <p:cNvGrpSpPr/>
+        <p:nvPr/>
+      </p:nvGrpSpPr>
+      <p:grpSpPr>
+        <a:xfrm>
+          <a:off x="0" y="0"/>
+          <a:ext cx="0" cy="0"/>
+          <a:chOff x="0" y="0"/>
+          <a:chExt cx="0" cy="0"/>
+        </a:xfrm>
+      </p:grpSpPr>
+      <p:sp>
+        <p:nvSpPr>
+          <p:cNvPr id="2" name="Title 1">
+            <a:extLst>
+              <a:ext uri="{FF2B5EF4-FFF2-40B4-BE49-F238E27FC236}">
+                <a16:creationId xmlns:a16="http://schemas.microsoft.com/office/drawing/2014/main" id="{3DA95041-41CF-FC4E-A255-72015EA8161C}"/>
+              </a:ext>
+            </a:extLst>
+          </p:cNvPr>
+          <p:cNvSpPr>
+            <a:spLocks noGrp="1"/>
+          </p:cNvSpPr>
+          <p:nvPr>
+            <p:ph type="title"/>
+          </p:nvPr>
+        </p:nvSpPr>
+        <p:spPr/>
+        <p:txBody>
+          <a:bodyPr>
+            <a:normAutofit/>
+          </a:bodyPr>
+          <a:lstStyle/>
+          <a:p>
+            <a:r>
+              <a:rPr lang="en-US" sz="4000" b="1" dirty="0">
+                <a:solidFill>
+                  <a:schemeClr val="bg1"/>
+                </a:solidFill>
+                <a:latin typeface="Apple Braille Pinpoint 8 Dot" pitchFamily="2" charset="0"/>
+              </a:rPr>
+              <a:t>Future Hypothesis</a:t>
+            </a:r>
+          </a:p>
+        </p:txBody>
+      </p:sp>
+      <p:sp>
+        <p:nvSpPr>
+          <p:cNvPr id="6" name="Content Placeholder 5">
+            <a:extLst>
+              <a:ext uri="{FF2B5EF4-FFF2-40B4-BE49-F238E27FC236}">
+                <a16:creationId xmlns:a16="http://schemas.microsoft.com/office/drawing/2014/main" id="{5D11C321-0CDF-7B45-970F-8E771D959316}"/>
+              </a:ext>
+            </a:extLst>
+          </p:cNvPr>
+          <p:cNvSpPr>
+            <a:spLocks noGrp="1"/>
+          </p:cNvSpPr>
+          <p:nvPr>
+            <p:ph idx="1"/>
+          </p:nvPr>
+        </p:nvSpPr>
+        <p:spPr>
+          <a:xfrm>
+            <a:off x="838200" y="1825625"/>
+            <a:ext cx="10515600" cy="4351338"/>
+          </a:xfrm>
+        </p:spPr>
+        <p:txBody>
+          <a:bodyPr>
+            <a:normAutofit/>
+          </a:bodyPr>
+          <a:lstStyle/>
+          <a:p>
+            <a:pPr>
+              <a:lnSpc>
+                <a:spcPct val="160000"/>
+              </a:lnSpc>
+            </a:pPr>
+            <a:r>
+              <a:rPr lang="en-US" sz="2000" dirty="0">
+                <a:solidFill>
+                  <a:schemeClr val="bg1"/>
+                </a:solidFill>
+                <a:latin typeface="Helvetica" pitchFamily="2" charset="0"/>
+              </a:rPr>
+              <a:t>Find correlation between other features and life expectancy</a:t>
+            </a:r>
+          </a:p>
+          <a:p>
+            <a:pPr>
+              <a:lnSpc>
+                <a:spcPct val="160000"/>
+              </a:lnSpc>
+            </a:pPr>
+            <a:r>
+              <a:rPr lang="en-US" sz="2000" dirty="0">
+                <a:solidFill>
+                  <a:schemeClr val="bg1"/>
+                </a:solidFill>
+                <a:latin typeface="Helvetica" pitchFamily="2" charset="0"/>
+              </a:rPr>
+              <a:t>Strengthen the conclusion results by using other tests (maybe normalize the life expectancy, and perform parametric tests, that have stronger results).</a:t>
+            </a:r>
+          </a:p>
+          <a:p>
+            <a:pPr>
+              <a:lnSpc>
+                <a:spcPct val="160000"/>
+              </a:lnSpc>
+            </a:pPr>
+            <a:r>
+              <a:rPr lang="en-US" sz="2000" dirty="0">
+                <a:solidFill>
+                  <a:schemeClr val="bg1"/>
+                </a:solidFill>
+                <a:latin typeface="Helvetica" pitchFamily="2" charset="0"/>
+              </a:rPr>
+              <a:t>Find a exercise to life expectancy dataset and join them to get a more efficient way to improve life expectancy, and to find balance.</a:t>
+            </a:r>
+          </a:p>
+          <a:p>
+            <a:pPr>
+              <a:lnSpc>
+                <a:spcPct val="160000"/>
+              </a:lnSpc>
+            </a:pPr>
+            <a:endParaRPr lang="en-US" sz="2000" dirty="0">
+              <a:solidFill>
+                <a:schemeClr val="bg1"/>
+              </a:solidFill>
+              <a:latin typeface="Helvetica" pitchFamily="2" charset="0"/>
+            </a:endParaRPr>
+          </a:p>
+        </p:txBody>
+      </p:sp>
+    </p:spTree>
+    <p:extLst>
+      <p:ext uri="{BB962C8B-B14F-4D97-AF65-F5344CB8AC3E}">
+        <p14:creationId xmlns:p14="http://schemas.microsoft.com/office/powerpoint/2010/main" val="1485266024"/>
       </p:ext>
     </p:extLst>
   </p:cSld>

</xml_diff>